<commit_message>
Modified slide 2 plus examples
</commit_message>
<xml_diff>
--- a/slides/BelajarPython_02_Col_Loop.pptx
+++ b/slides/BelajarPython_02_Col_Loop.pptx
@@ -137,11 +137,105 @@
 <pc:chgInfo xmlns:a="http://schemas.openxmlformats.org/drawingml/2006/main" xmlns:r="http://schemas.openxmlformats.org/officeDocument/2006/relationships" xmlns:ac="http://schemas.microsoft.com/office/drawing/2013/main/command" xmlns:pc="http://schemas.microsoft.com/office/powerpoint/2013/main/command">
   <pc:docChgLst>
     <pc:chgData name="Mico Siahaan" userId="a87d3b564efc7573" providerId="LiveId" clId="{A8ED8186-59D8-47BA-A323-CA00C14650C0}"/>
-    <pc:docChg chg="custSel addSld delSld modSld">
-      <pc:chgData name="Mico Siahaan" userId="a87d3b564efc7573" providerId="LiveId" clId="{A8ED8186-59D8-47BA-A323-CA00C14650C0}" dt="2023-09-08T14:41:43.723" v="266" actId="26606"/>
+    <pc:docChg chg="undo custSel addSld delSld modSld">
+      <pc:chgData name="Mico Siahaan" userId="a87d3b564efc7573" providerId="LiveId" clId="{A8ED8186-59D8-47BA-A323-CA00C14650C0}" dt="2023-09-09T14:16:56.666" v="481" actId="26606"/>
       <pc:docMkLst>
         <pc:docMk/>
       </pc:docMkLst>
+      <pc:sldChg chg="addSp delSp modSp mod setBg">
+        <pc:chgData name="Mico Siahaan" userId="a87d3b564efc7573" providerId="LiveId" clId="{A8ED8186-59D8-47BA-A323-CA00C14650C0}" dt="2023-09-09T13:53:04.247" v="269" actId="26606"/>
+        <pc:sldMkLst>
+          <pc:docMk/>
+          <pc:sldMk cId="4124399745" sldId="258"/>
+        </pc:sldMkLst>
+        <pc:spChg chg="add del mod">
+          <ac:chgData name="Mico Siahaan" userId="a87d3b564efc7573" providerId="LiveId" clId="{A8ED8186-59D8-47BA-A323-CA00C14650C0}" dt="2023-09-09T13:53:02.073" v="268" actId="22"/>
+          <ac:spMkLst>
+            <pc:docMk/>
+            <pc:sldMk cId="4124399745" sldId="258"/>
+            <ac:spMk id="3" creationId="{9F3C6880-C4F7-930A-5B5D-53B543998839}"/>
+          </ac:spMkLst>
+        </pc:spChg>
+        <pc:spChg chg="mod">
+          <ac:chgData name="Mico Siahaan" userId="a87d3b564efc7573" providerId="LiveId" clId="{A8ED8186-59D8-47BA-A323-CA00C14650C0}" dt="2023-09-09T13:53:04.247" v="269" actId="26606"/>
+          <ac:spMkLst>
+            <pc:docMk/>
+            <pc:sldMk cId="4124399745" sldId="258"/>
+            <ac:spMk id="4" creationId="{BFA33DDE-F022-EAB0-D158-05DB8CDCB8B8}"/>
+          </ac:spMkLst>
+        </pc:spChg>
+        <pc:spChg chg="mod">
+          <ac:chgData name="Mico Siahaan" userId="a87d3b564efc7573" providerId="LiveId" clId="{A8ED8186-59D8-47BA-A323-CA00C14650C0}" dt="2023-09-09T13:53:04.247" v="269" actId="26606"/>
+          <ac:spMkLst>
+            <pc:docMk/>
+            <pc:sldMk cId="4124399745" sldId="258"/>
+            <ac:spMk id="5" creationId="{AF870020-EF77-6DF6-FDE1-0879A3C04EA2}"/>
+          </ac:spMkLst>
+        </pc:spChg>
+        <pc:picChg chg="add mod ord">
+          <ac:chgData name="Mico Siahaan" userId="a87d3b564efc7573" providerId="LiveId" clId="{A8ED8186-59D8-47BA-A323-CA00C14650C0}" dt="2023-09-09T13:53:04.247" v="269" actId="26606"/>
+          <ac:picMkLst>
+            <pc:docMk/>
+            <pc:sldMk cId="4124399745" sldId="258"/>
+            <ac:picMk id="7" creationId="{EE6D5048-97A4-D9F0-2FBF-06EF4C9320E8}"/>
+          </ac:picMkLst>
+        </pc:picChg>
+        <pc:picChg chg="del">
+          <ac:chgData name="Mico Siahaan" userId="a87d3b564efc7573" providerId="LiveId" clId="{A8ED8186-59D8-47BA-A323-CA00C14650C0}" dt="2023-09-09T13:52:01.842" v="267" actId="478"/>
+          <ac:picMkLst>
+            <pc:docMk/>
+            <pc:sldMk cId="4124399745" sldId="258"/>
+            <ac:picMk id="8" creationId="{727C981D-0055-FBD7-5D8D-E83016A70F90}"/>
+          </ac:picMkLst>
+        </pc:picChg>
+      </pc:sldChg>
+      <pc:sldChg chg="addSp delSp modSp mod setBg">
+        <pc:chgData name="Mico Siahaan" userId="a87d3b564efc7573" providerId="LiveId" clId="{A8ED8186-59D8-47BA-A323-CA00C14650C0}" dt="2023-09-09T13:54:46.757" v="272" actId="26606"/>
+        <pc:sldMkLst>
+          <pc:docMk/>
+          <pc:sldMk cId="3145110681" sldId="259"/>
+        </pc:sldMkLst>
+        <pc:spChg chg="add del mod">
+          <ac:chgData name="Mico Siahaan" userId="a87d3b564efc7573" providerId="LiveId" clId="{A8ED8186-59D8-47BA-A323-CA00C14650C0}" dt="2023-09-09T13:54:44.803" v="271" actId="22"/>
+          <ac:spMkLst>
+            <pc:docMk/>
+            <pc:sldMk cId="3145110681" sldId="259"/>
+            <ac:spMk id="3" creationId="{F085721C-58DA-4475-7F0E-0ECE3B5F7D9A}"/>
+          </ac:spMkLst>
+        </pc:spChg>
+        <pc:spChg chg="mod">
+          <ac:chgData name="Mico Siahaan" userId="a87d3b564efc7573" providerId="LiveId" clId="{A8ED8186-59D8-47BA-A323-CA00C14650C0}" dt="2023-09-09T13:54:46.757" v="272" actId="26606"/>
+          <ac:spMkLst>
+            <pc:docMk/>
+            <pc:sldMk cId="3145110681" sldId="259"/>
+            <ac:spMk id="4" creationId="{A757DB6B-F6C7-D193-86E9-BE35C77F8582}"/>
+          </ac:spMkLst>
+        </pc:spChg>
+        <pc:spChg chg="mod">
+          <ac:chgData name="Mico Siahaan" userId="a87d3b564efc7573" providerId="LiveId" clId="{A8ED8186-59D8-47BA-A323-CA00C14650C0}" dt="2023-09-09T13:54:46.757" v="272" actId="26606"/>
+          <ac:spMkLst>
+            <pc:docMk/>
+            <pc:sldMk cId="3145110681" sldId="259"/>
+            <ac:spMk id="5" creationId="{073B2E9F-3422-AF06-8906-03BD1983E6DC}"/>
+          </ac:spMkLst>
+        </pc:spChg>
+        <pc:picChg chg="add mod ord">
+          <ac:chgData name="Mico Siahaan" userId="a87d3b564efc7573" providerId="LiveId" clId="{A8ED8186-59D8-47BA-A323-CA00C14650C0}" dt="2023-09-09T13:54:46.757" v="272" actId="26606"/>
+          <ac:picMkLst>
+            <pc:docMk/>
+            <pc:sldMk cId="3145110681" sldId="259"/>
+            <ac:picMk id="7" creationId="{492B6EA3-431A-7D42-26B1-36A90CEEA8A8}"/>
+          </ac:picMkLst>
+        </pc:picChg>
+        <pc:picChg chg="del">
+          <ac:chgData name="Mico Siahaan" userId="a87d3b564efc7573" providerId="LiveId" clId="{A8ED8186-59D8-47BA-A323-CA00C14650C0}" dt="2023-09-09T13:53:36.342" v="270" actId="478"/>
+          <ac:picMkLst>
+            <pc:docMk/>
+            <pc:sldMk cId="3145110681" sldId="259"/>
+            <ac:picMk id="8" creationId="{5B04D229-6600-AAA4-40FE-D71898B7A661}"/>
+          </ac:picMkLst>
+        </pc:picChg>
+      </pc:sldChg>
       <pc:sldChg chg="modSp mod setBg">
         <pc:chgData name="Mico Siahaan" userId="a87d3b564efc7573" providerId="LiveId" clId="{A8ED8186-59D8-47BA-A323-CA00C14650C0}" dt="2023-09-08T14:41:32.421" v="264" actId="26606"/>
         <pc:sldMkLst>
@@ -288,7 +382,7 @@
         </pc:spChg>
       </pc:sldChg>
       <pc:sldChg chg="addSp delSp modSp mod setBg">
-        <pc:chgData name="Mico Siahaan" userId="a87d3b564efc7573" providerId="LiveId" clId="{A8ED8186-59D8-47BA-A323-CA00C14650C0}" dt="2023-09-08T14:10:47.097" v="58" actId="26606"/>
+        <pc:chgData name="Mico Siahaan" userId="a87d3b564efc7573" providerId="LiveId" clId="{A8ED8186-59D8-47BA-A323-CA00C14650C0}" dt="2023-09-09T13:59:09.206" v="292" actId="26606"/>
         <pc:sldMkLst>
           <pc:docMk/>
           <pc:sldMk cId="2005859422" sldId="264"/>
@@ -310,15 +404,23 @@
           </ac:spMkLst>
         </pc:spChg>
         <pc:spChg chg="mod">
-          <ac:chgData name="Mico Siahaan" userId="a87d3b564efc7573" providerId="LiveId" clId="{A8ED8186-59D8-47BA-A323-CA00C14650C0}" dt="2023-09-08T14:10:47.097" v="58" actId="26606"/>
+          <ac:chgData name="Mico Siahaan" userId="a87d3b564efc7573" providerId="LiveId" clId="{A8ED8186-59D8-47BA-A323-CA00C14650C0}" dt="2023-09-09T13:59:09.206" v="292" actId="26606"/>
           <ac:spMkLst>
             <pc:docMk/>
             <pc:sldMk cId="2005859422" sldId="264"/>
             <ac:spMk id="5" creationId="{AF870020-EF77-6DF6-FDE1-0879A3C04EA2}"/>
           </ac:spMkLst>
         </pc:spChg>
+        <pc:picChg chg="add mod">
+          <ac:chgData name="Mico Siahaan" userId="a87d3b564efc7573" providerId="LiveId" clId="{A8ED8186-59D8-47BA-A323-CA00C14650C0}" dt="2023-09-09T13:59:09.206" v="292" actId="26606"/>
+          <ac:picMkLst>
+            <pc:docMk/>
+            <pc:sldMk cId="2005859422" sldId="264"/>
+            <ac:picMk id="3" creationId="{BD6EFAC0-E8F9-FD9E-13BC-922E84468BE2}"/>
+          </ac:picMkLst>
+        </pc:picChg>
         <pc:picChg chg="add mod ord">
-          <ac:chgData name="Mico Siahaan" userId="a87d3b564efc7573" providerId="LiveId" clId="{A8ED8186-59D8-47BA-A323-CA00C14650C0}" dt="2023-09-08T14:10:47.097" v="58" actId="26606"/>
+          <ac:chgData name="Mico Siahaan" userId="a87d3b564efc7573" providerId="LiveId" clId="{A8ED8186-59D8-47BA-A323-CA00C14650C0}" dt="2023-09-09T13:59:09.206" v="292" actId="26606"/>
           <ac:picMkLst>
             <pc:docMk/>
             <pc:sldMk cId="2005859422" sldId="264"/>
@@ -333,8 +435,8 @@
             <ac:picMk id="8" creationId="{727C981D-0055-FBD7-5D8D-E83016A70F90}"/>
           </ac:picMkLst>
         </pc:picChg>
-        <pc:picChg chg="add mod">
-          <ac:chgData name="Mico Siahaan" userId="a87d3b564efc7573" providerId="LiveId" clId="{A8ED8186-59D8-47BA-A323-CA00C14650C0}" dt="2023-09-08T14:10:47.097" v="58" actId="26606"/>
+        <pc:picChg chg="add del mod">
+          <ac:chgData name="Mico Siahaan" userId="a87d3b564efc7573" providerId="LiveId" clId="{A8ED8186-59D8-47BA-A323-CA00C14650C0}" dt="2023-09-09T13:55:27.929" v="284" actId="478"/>
           <ac:picMkLst>
             <pc:docMk/>
             <pc:sldMk cId="2005859422" sldId="264"/>
@@ -358,7 +460,7 @@
         </pc:spChg>
       </pc:sldChg>
       <pc:sldChg chg="addSp delSp modSp mod setBg">
-        <pc:chgData name="Mico Siahaan" userId="a87d3b564efc7573" providerId="LiveId" clId="{A8ED8186-59D8-47BA-A323-CA00C14650C0}" dt="2023-09-08T14:28:14.328" v="140" actId="20577"/>
+        <pc:chgData name="Mico Siahaan" userId="a87d3b564efc7573" providerId="LiveId" clId="{A8ED8186-59D8-47BA-A323-CA00C14650C0}" dt="2023-09-09T14:06:23.442" v="423" actId="26606"/>
         <pc:sldMkLst>
           <pc:docMk/>
           <pc:sldMk cId="1177734226" sldId="266"/>
@@ -372,7 +474,7 @@
           </ac:spMkLst>
         </pc:spChg>
         <pc:spChg chg="mod">
-          <ac:chgData name="Mico Siahaan" userId="a87d3b564efc7573" providerId="LiveId" clId="{A8ED8186-59D8-47BA-A323-CA00C14650C0}" dt="2023-09-08T14:28:14.328" v="140" actId="20577"/>
+          <ac:chgData name="Mico Siahaan" userId="a87d3b564efc7573" providerId="LiveId" clId="{A8ED8186-59D8-47BA-A323-CA00C14650C0}" dt="2023-09-09T14:06:23.442" v="423" actId="26606"/>
           <ac:spMkLst>
             <pc:docMk/>
             <pc:sldMk cId="1177734226" sldId="266"/>
@@ -387,8 +489,16 @@
             <ac:picMk id="2" creationId="{4403D7CC-DE4E-6850-8541-097C17F2996F}"/>
           </ac:picMkLst>
         </pc:picChg>
-        <pc:picChg chg="add mod">
-          <ac:chgData name="Mico Siahaan" userId="a87d3b564efc7573" providerId="LiveId" clId="{A8ED8186-59D8-47BA-A323-CA00C14650C0}" dt="2023-09-08T14:22:27.709" v="138" actId="26606"/>
+        <pc:picChg chg="add del">
+          <ac:chgData name="Mico Siahaan" userId="a87d3b564efc7573" providerId="LiveId" clId="{A8ED8186-59D8-47BA-A323-CA00C14650C0}" dt="2023-09-09T14:06:01.585" v="420" actId="478"/>
+          <ac:picMkLst>
+            <pc:docMk/>
+            <pc:sldMk cId="1177734226" sldId="266"/>
+            <ac:picMk id="3" creationId="{78A56E4C-ADFD-2ABF-49EE-73DB521B46E4}"/>
+          </ac:picMkLst>
+        </pc:picChg>
+        <pc:picChg chg="add del mod">
+          <ac:chgData name="Mico Siahaan" userId="a87d3b564efc7573" providerId="LiveId" clId="{A8ED8186-59D8-47BA-A323-CA00C14650C0}" dt="2023-09-09T14:05:49.644" v="418" actId="478"/>
           <ac:picMkLst>
             <pc:docMk/>
             <pc:sldMk cId="1177734226" sldId="266"/>
@@ -396,11 +506,19 @@
           </ac:picMkLst>
         </pc:picChg>
         <pc:picChg chg="ord">
-          <ac:chgData name="Mico Siahaan" userId="a87d3b564efc7573" providerId="LiveId" clId="{A8ED8186-59D8-47BA-A323-CA00C14650C0}" dt="2023-09-08T14:22:27.709" v="138" actId="26606"/>
+          <ac:chgData name="Mico Siahaan" userId="a87d3b564efc7573" providerId="LiveId" clId="{A8ED8186-59D8-47BA-A323-CA00C14650C0}" dt="2023-09-09T14:06:23.442" v="423" actId="26606"/>
           <ac:picMkLst>
             <pc:docMk/>
             <pc:sldMk cId="1177734226" sldId="266"/>
             <ac:picMk id="7" creationId="{EDFE5F3F-15E3-BCC0-C327-AC4C1A19C340}"/>
+          </ac:picMkLst>
+        </pc:picChg>
+        <pc:picChg chg="add mod">
+          <ac:chgData name="Mico Siahaan" userId="a87d3b564efc7573" providerId="LiveId" clId="{A8ED8186-59D8-47BA-A323-CA00C14650C0}" dt="2023-09-09T14:06:23.442" v="423" actId="26606"/>
+          <ac:picMkLst>
+            <pc:docMk/>
+            <pc:sldMk cId="1177734226" sldId="266"/>
+            <ac:picMk id="9" creationId="{70BC5809-5BF7-0F7E-2CB6-790B642ABCC9}"/>
           </ac:picMkLst>
         </pc:picChg>
         <pc:picChg chg="del">
@@ -450,8 +568,8 @@
           </ac:spMkLst>
         </pc:spChg>
       </pc:sldChg>
-      <pc:sldChg chg="addSp delSp modSp mod">
-        <pc:chgData name="Mico Siahaan" userId="a87d3b564efc7573" providerId="LiveId" clId="{A8ED8186-59D8-47BA-A323-CA00C14650C0}" dt="2023-09-08T14:41:16.707" v="261" actId="1076"/>
+      <pc:sldChg chg="addSp delSp modSp mod setBg">
+        <pc:chgData name="Mico Siahaan" userId="a87d3b564efc7573" providerId="LiveId" clId="{A8ED8186-59D8-47BA-A323-CA00C14650C0}" dt="2023-09-09T14:16:56.666" v="481" actId="26606"/>
         <pc:sldMkLst>
           <pc:docMk/>
           <pc:sldMk cId="2596875323" sldId="269"/>
@@ -465,7 +583,7 @@
           </ac:spMkLst>
         </pc:spChg>
         <pc:spChg chg="mod">
-          <ac:chgData name="Mico Siahaan" userId="a87d3b564efc7573" providerId="LiveId" clId="{A8ED8186-59D8-47BA-A323-CA00C14650C0}" dt="2023-09-08T14:40:50.331" v="255" actId="313"/>
+          <ac:chgData name="Mico Siahaan" userId="a87d3b564efc7573" providerId="LiveId" clId="{A8ED8186-59D8-47BA-A323-CA00C14650C0}" dt="2023-09-09T14:16:56.666" v="481" actId="26606"/>
           <ac:spMkLst>
             <pc:docMk/>
             <pc:sldMk cId="2596875323" sldId="269"/>
@@ -480,6 +598,14 @@
             <ac:picMk id="2" creationId="{C6578508-5CBF-75BB-DB01-7FCFB11274D3}"/>
           </ac:picMkLst>
         </pc:picChg>
+        <pc:picChg chg="add mod">
+          <ac:chgData name="Mico Siahaan" userId="a87d3b564efc7573" providerId="LiveId" clId="{A8ED8186-59D8-47BA-A323-CA00C14650C0}" dt="2023-09-09T14:16:56.666" v="481" actId="26606"/>
+          <ac:picMkLst>
+            <pc:docMk/>
+            <pc:sldMk cId="2596875323" sldId="269"/>
+            <ac:picMk id="3" creationId="{127DED2F-8FFA-92CF-93F6-C1AF249FAF3B}"/>
+          </ac:picMkLst>
+        </pc:picChg>
         <pc:picChg chg="del">
           <ac:chgData name="Mico Siahaan" userId="a87d3b564efc7573" providerId="LiveId" clId="{A8ED8186-59D8-47BA-A323-CA00C14650C0}" dt="2023-09-08T14:40:59.897" v="256" actId="478"/>
           <ac:picMkLst>
@@ -488,8 +614,16 @@
             <ac:picMk id="6" creationId="{8856CF61-66DE-D642-D72C-EAEDBBF35618}"/>
           </ac:picMkLst>
         </pc:picChg>
-        <pc:picChg chg="add mod">
-          <ac:chgData name="Mico Siahaan" userId="a87d3b564efc7573" providerId="LiveId" clId="{A8ED8186-59D8-47BA-A323-CA00C14650C0}" dt="2023-09-08T14:41:16.707" v="261" actId="1076"/>
+        <pc:picChg chg="ord">
+          <ac:chgData name="Mico Siahaan" userId="a87d3b564efc7573" providerId="LiveId" clId="{A8ED8186-59D8-47BA-A323-CA00C14650C0}" dt="2023-09-09T14:16:56.666" v="481" actId="26606"/>
+          <ac:picMkLst>
+            <pc:docMk/>
+            <pc:sldMk cId="2596875323" sldId="269"/>
+            <ac:picMk id="7" creationId="{EDFE5F3F-15E3-BCC0-C327-AC4C1A19C340}"/>
+          </ac:picMkLst>
+        </pc:picChg>
+        <pc:picChg chg="add del mod">
+          <ac:chgData name="Mico Siahaan" userId="a87d3b564efc7573" providerId="LiveId" clId="{A8ED8186-59D8-47BA-A323-CA00C14650C0}" dt="2023-09-09T14:07:14.370" v="478" actId="478"/>
           <ac:picMkLst>
             <pc:docMk/>
             <pc:sldMk cId="2596875323" sldId="269"/>
@@ -1170,7 +1304,7 @@
             <a:fld id="{B61BEF0D-F0BB-DE4B-95CE-6DB70DBA9567}" type="datetimeFigureOut">
               <a:rPr lang="en-US" dirty="0"/>
               <a:pPr/>
-              <a:t>9/8/2023</a:t>
+              <a:t>9/9/2023</a:t>
             </a:fld>
             <a:endParaRPr lang="en-US" dirty="0"/>
           </a:p>
@@ -1458,7 +1592,7 @@
             <a:fld id="{B61BEF0D-F0BB-DE4B-95CE-6DB70DBA9567}" type="datetimeFigureOut">
               <a:rPr lang="en-US" dirty="0"/>
               <a:pPr/>
-              <a:t>9/8/2023</a:t>
+              <a:t>9/9/2023</a:t>
             </a:fld>
             <a:endParaRPr lang="en-US" dirty="0"/>
           </a:p>
@@ -1718,7 +1852,7 @@
             <a:fld id="{B61BEF0D-F0BB-DE4B-95CE-6DB70DBA9567}" type="datetimeFigureOut">
               <a:rPr lang="en-US" dirty="0"/>
               <a:pPr/>
-              <a:t>9/8/2023</a:t>
+              <a:t>9/9/2023</a:t>
             </a:fld>
             <a:endParaRPr lang="en-US" dirty="0"/>
           </a:p>
@@ -2188,7 +2322,7 @@
             <a:fld id="{B61BEF0D-F0BB-DE4B-95CE-6DB70DBA9567}" type="datetimeFigureOut">
               <a:rPr lang="en-US" dirty="0"/>
               <a:pPr/>
-              <a:t>9/8/2023</a:t>
+              <a:t>9/9/2023</a:t>
             </a:fld>
             <a:endParaRPr lang="en-US" dirty="0"/>
           </a:p>
@@ -2369,7 +2503,7 @@
             <a:fld id="{B61BEF0D-F0BB-DE4B-95CE-6DB70DBA9567}" type="datetimeFigureOut">
               <a:rPr lang="en-US" dirty="0"/>
               <a:pPr/>
-              <a:t>9/8/2023</a:t>
+              <a:t>9/9/2023</a:t>
             </a:fld>
             <a:endParaRPr lang="en-US" dirty="0"/>
           </a:p>
@@ -2946,7 +3080,7 @@
             <a:fld id="{B61BEF0D-F0BB-DE4B-95CE-6DB70DBA9567}" type="datetimeFigureOut">
               <a:rPr lang="en-US" dirty="0"/>
               <a:pPr/>
-              <a:t>9/8/2023</a:t>
+              <a:t>9/9/2023</a:t>
             </a:fld>
             <a:endParaRPr lang="en-US" dirty="0"/>
           </a:p>
@@ -3279,7 +3413,7 @@
             <a:fld id="{B61BEF0D-F0BB-DE4B-95CE-6DB70DBA9567}" type="datetimeFigureOut">
               <a:rPr lang="en-US" dirty="0"/>
               <a:pPr/>
-              <a:t>9/8/2023</a:t>
+              <a:t>9/9/2023</a:t>
             </a:fld>
             <a:endParaRPr lang="en-US" dirty="0"/>
           </a:p>
@@ -3454,7 +3588,7 @@
             <a:fld id="{B61BEF0D-F0BB-DE4B-95CE-6DB70DBA9567}" type="datetimeFigureOut">
               <a:rPr lang="en-US" dirty="0"/>
               <a:pPr/>
-              <a:t>9/8/2023</a:t>
+              <a:t>9/9/2023</a:t>
             </a:fld>
             <a:endParaRPr lang="en-US" dirty="0"/>
           </a:p>
@@ -3634,7 +3768,7 @@
             <a:fld id="{B61BEF0D-F0BB-DE4B-95CE-6DB70DBA9567}" type="datetimeFigureOut">
               <a:rPr lang="en-US" dirty="0"/>
               <a:pPr/>
-              <a:t>9/8/2023</a:t>
+              <a:t>9/9/2023</a:t>
             </a:fld>
             <a:endParaRPr lang="en-US" dirty="0"/>
           </a:p>
@@ -3804,7 +3938,7 @@
             <a:fld id="{B61BEF0D-F0BB-DE4B-95CE-6DB70DBA9567}" type="datetimeFigureOut">
               <a:rPr lang="en-US" dirty="0"/>
               <a:pPr/>
-              <a:t>9/8/2023</a:t>
+              <a:t>9/9/2023</a:t>
             </a:fld>
             <a:endParaRPr lang="en-US" dirty="0"/>
           </a:p>
@@ -4062,7 +4196,7 @@
             <a:fld id="{B61BEF0D-F0BB-DE4B-95CE-6DB70DBA9567}" type="datetimeFigureOut">
               <a:rPr lang="en-US" dirty="0"/>
               <a:pPr/>
-              <a:t>9/8/2023</a:t>
+              <a:t>9/9/2023</a:t>
             </a:fld>
             <a:endParaRPr lang="en-US" dirty="0"/>
           </a:p>
@@ -4353,7 +4487,7 @@
             <a:fld id="{B61BEF0D-F0BB-DE4B-95CE-6DB70DBA9567}" type="datetimeFigureOut">
               <a:rPr lang="en-US" dirty="0"/>
               <a:pPr/>
-              <a:t>9/8/2023</a:t>
+              <a:t>9/9/2023</a:t>
             </a:fld>
             <a:endParaRPr lang="en-US" dirty="0"/>
           </a:p>
@@ -4782,7 +4916,7 @@
             <a:fld id="{B61BEF0D-F0BB-DE4B-95CE-6DB70DBA9567}" type="datetimeFigureOut">
               <a:rPr lang="en-US" dirty="0"/>
               <a:pPr/>
-              <a:t>9/8/2023</a:t>
+              <a:t>9/9/2023</a:t>
             </a:fld>
             <a:endParaRPr lang="en-US" dirty="0"/>
           </a:p>
@@ -4901,7 +5035,7 @@
             <a:fld id="{B61BEF0D-F0BB-DE4B-95CE-6DB70DBA9567}" type="datetimeFigureOut">
               <a:rPr lang="en-US" dirty="0"/>
               <a:pPr/>
-              <a:t>9/8/2023</a:t>
+              <a:t>9/9/2023</a:t>
             </a:fld>
             <a:endParaRPr lang="en-US" dirty="0"/>
           </a:p>
@@ -4998,7 +5132,7 @@
             <a:fld id="{B61BEF0D-F0BB-DE4B-95CE-6DB70DBA9567}" type="datetimeFigureOut">
               <a:rPr lang="en-US" dirty="0"/>
               <a:pPr/>
-              <a:t>9/8/2023</a:t>
+              <a:t>9/9/2023</a:t>
             </a:fld>
             <a:endParaRPr lang="en-US" dirty="0"/>
           </a:p>
@@ -5281,7 +5415,7 @@
             <a:fld id="{B61BEF0D-F0BB-DE4B-95CE-6DB70DBA9567}" type="datetimeFigureOut">
               <a:rPr lang="en-US" dirty="0"/>
               <a:pPr/>
-              <a:t>9/8/2023</a:t>
+              <a:t>9/9/2023</a:t>
             </a:fld>
             <a:endParaRPr lang="en-US" dirty="0"/>
           </a:p>
@@ -5569,7 +5703,7 @@
             <a:fld id="{B61BEF0D-F0BB-DE4B-95CE-6DB70DBA9567}" type="datetimeFigureOut">
               <a:rPr lang="en-US" dirty="0"/>
               <a:pPr/>
-              <a:t>9/8/2023</a:t>
+              <a:t>9/9/2023</a:t>
             </a:fld>
             <a:endParaRPr lang="en-US" dirty="0"/>
           </a:p>
@@ -5828,7 +5962,7 @@
             <a:fld id="{B61BEF0D-F0BB-DE4B-95CE-6DB70DBA9567}" type="datetimeFigureOut">
               <a:rPr lang="en-US" dirty="0"/>
               <a:pPr/>
-              <a:t>9/8/2023</a:t>
+              <a:t>9/9/2023</a:t>
             </a:fld>
             <a:endParaRPr lang="en-US" dirty="0"/>
           </a:p>
@@ -7324,6 +7458,29 @@
 <file path=ppt/slides/slide10.xml><?xml version="1.0" encoding="utf-8"?>
 <p:sld xmlns:a="http://schemas.openxmlformats.org/drawingml/2006/main" xmlns:r="http://schemas.openxmlformats.org/officeDocument/2006/relationships" xmlns:p="http://schemas.openxmlformats.org/presentationml/2006/main">
   <p:cSld>
+    <p:bg>
+      <p:bgPr>
+        <a:blipFill rotWithShape="1">
+          <a:blip r:embed="rId2">
+            <a:duotone>
+              <a:schemeClr val="bg2">
+                <a:shade val="28000"/>
+                <a:satMod val="94000"/>
+                <a:lumMod val="20000"/>
+              </a:schemeClr>
+              <a:schemeClr val="bg2">
+                <a:tint val="94000"/>
+                <a:shade val="84000"/>
+                <a:satMod val="148000"/>
+                <a:lumMod val="114000"/>
+              </a:schemeClr>
+            </a:duotone>
+          </a:blip>
+          <a:stretch/>
+        </a:blipFill>
+        <a:effectLst/>
+      </p:bgPr>
+    </p:bg>
     <p:spTree>
       <p:nvGrpSpPr>
         <p:cNvPr id="1" name=""/>
@@ -7408,7 +7565,7 @@
           </a:p>
           <a:p>
             <a:r>
-              <a:rPr lang="en-US" dirty="0" err="1"/>
+              <a:rPr lang="en-US"/>
               <a:t>Dapat</a:t>
             </a:r>
             <a:r>
@@ -7416,7 +7573,7 @@
               <a:t> </a:t>
             </a:r>
             <a:r>
-              <a:rPr lang="en-US" dirty="0" err="1"/>
+              <a:rPr lang="en-US"/>
               <a:t>memuat</a:t>
             </a:r>
             <a:r>
@@ -7424,7 +7581,7 @@
               <a:t> </a:t>
             </a:r>
             <a:r>
-              <a:rPr lang="en-US" dirty="0" err="1"/>
+              <a:rPr lang="en-US"/>
               <a:t>tipe</a:t>
             </a:r>
             <a:r>
@@ -7432,82 +7589,77 @@
               <a:t> data lain: string, </a:t>
             </a:r>
             <a:r>
-              <a:rPr lang="en-US" dirty="0" err="1"/>
+              <a:rPr lang="en-US"/>
               <a:t>bilangan</a:t>
             </a:r>
+            <a:r>
+              <a:rPr lang="en-US" dirty="0"/>
+              <a:t>, </a:t>
+            </a:r>
+            <a:r>
+              <a:rPr lang="en-US"/>
+              <a:t>ataupun</a:t>
+            </a:r>
+            <a:r>
+              <a:rPr lang="en-US" dirty="0"/>
+              <a:t> </a:t>
+            </a:r>
+            <a:r>
+              <a:rPr lang="en-US"/>
+              <a:t>koleksi</a:t>
+            </a:r>
+            <a:r>
+              <a:rPr lang="en-US" dirty="0"/>
+              <a:t> lain</a:t>
+            </a:r>
+          </a:p>
+          <a:p>
+            <a:r>
+              <a:rPr lang="en-US"/>
+              <a:t>Tidak</a:t>
+            </a:r>
+            <a:r>
+              <a:rPr lang="en-US" dirty="0"/>
+              <a:t> </a:t>
+            </a:r>
+            <a:r>
+              <a:rPr lang="en-US"/>
+              <a:t>menggunakan</a:t>
+            </a:r>
+            <a:r>
+              <a:rPr lang="en-US" dirty="0"/>
+              <a:t> </a:t>
+            </a:r>
+            <a:r>
+              <a:rPr lang="en-US"/>
+              <a:t>indeks</a:t>
+            </a:r>
+            <a:r>
+              <a:rPr lang="en-US" dirty="0"/>
+              <a:t>, </a:t>
+            </a:r>
+            <a:r>
+              <a:rPr lang="en-US"/>
+              <a:t>menggunakan</a:t>
+            </a:r>
+            <a:r>
+              <a:rPr lang="en-US" dirty="0"/>
+              <a:t> ‘key’ yang </a:t>
+            </a:r>
+            <a:r>
+              <a:rPr lang="en-US"/>
+              <a:t>unik</a:t>
+            </a:r>
             <a:endParaRPr lang="en-US" dirty="0"/>
-          </a:p>
-          <a:p>
-            <a:r>
-              <a:rPr lang="en-US" dirty="0" err="1"/>
-              <a:t>Tidak</a:t>
-            </a:r>
-            <a:r>
-              <a:rPr lang="en-US" dirty="0"/>
-              <a:t> </a:t>
-            </a:r>
-            <a:r>
-              <a:rPr lang="en-US" dirty="0" err="1"/>
-              <a:t>menggunakan</a:t>
-            </a:r>
-            <a:r>
-              <a:rPr lang="en-US" dirty="0"/>
-              <a:t> </a:t>
-            </a:r>
-            <a:r>
-              <a:rPr lang="en-US" dirty="0" err="1"/>
-              <a:t>indeks</a:t>
-            </a:r>
-            <a:r>
-              <a:rPr lang="en-US" dirty="0"/>
-              <a:t>, </a:t>
-            </a:r>
-            <a:r>
-              <a:rPr lang="en-US" dirty="0" err="1"/>
-              <a:t>menggunakan</a:t>
-            </a:r>
-            <a:r>
-              <a:rPr lang="en-US" dirty="0"/>
-              <a:t> ‘key’</a:t>
-            </a:r>
           </a:p>
         </p:txBody>
       </p:sp>
       <p:pic>
         <p:nvPicPr>
-          <p:cNvPr id="7" name="Content Placeholder 6">
+          <p:cNvPr id="3" name="Picture 2">
             <a:extLst>
               <a:ext uri="{FF2B5EF4-FFF2-40B4-BE49-F238E27FC236}">
-                <a16:creationId xmlns:a16="http://schemas.microsoft.com/office/drawing/2014/main" id="{EDFE5F3F-15E3-BCC0-C327-AC4C1A19C340}"/>
-              </a:ext>
-            </a:extLst>
-          </p:cNvPr>
-          <p:cNvPicPr>
-            <a:picLocks noGrp="1" noChangeAspect="1"/>
-          </p:cNvPicPr>
-          <p:nvPr>
-            <p:ph sz="half" idx="2"/>
-          </p:nvPr>
-        </p:nvPicPr>
-        <p:blipFill>
-          <a:blip r:embed="rId2"/>
-          <a:stretch>
-            <a:fillRect/>
-          </a:stretch>
-        </p:blipFill>
-        <p:spPr>
-          <a:xfrm>
-            <a:off x="8608990" y="4229085"/>
-            <a:ext cx="46" cy="30"/>
-          </a:xfrm>
-        </p:spPr>
-      </p:pic>
-      <p:pic>
-        <p:nvPicPr>
-          <p:cNvPr id="8" name="Picture 7">
-            <a:extLst>
-              <a:ext uri="{FF2B5EF4-FFF2-40B4-BE49-F238E27FC236}">
-                <a16:creationId xmlns:a16="http://schemas.microsoft.com/office/drawing/2014/main" id="{E984DD38-CFFF-446E-8738-7A0C6158E23D}"/>
+                <a16:creationId xmlns:a16="http://schemas.microsoft.com/office/drawing/2014/main" id="{127DED2F-8FFA-92CF-93F6-C1AF249FAF3B}"/>
               </a:ext>
             </a:extLst>
           </p:cNvPr>
@@ -7524,12 +7676,66 @@
         </p:blipFill>
         <p:spPr>
           <a:xfrm>
-            <a:off x="4572000" y="855548"/>
-            <a:ext cx="6848943" cy="5146903"/>
+            <a:off x="4630994" y="1176698"/>
+            <a:ext cx="6916633" cy="4184563"/>
           </a:xfrm>
-          <a:prstGeom prst="rect">
-            <a:avLst/>
+          <a:prstGeom prst="roundRect">
+            <a:avLst>
+              <a:gd name="adj" fmla="val 3517"/>
+            </a:avLst>
           </a:prstGeom>
+          <a:ln w="38100">
+            <a:gradFill flip="none" rotWithShape="1">
+              <a:gsLst>
+                <a:gs pos="0">
+                  <a:srgbClr val="363D46"/>
+                </a:gs>
+                <a:gs pos="100000">
+                  <a:srgbClr val="363D46">
+                    <a:lumMod val="75000"/>
+                  </a:srgbClr>
+                </a:gs>
+              </a:gsLst>
+              <a:lin ang="5400000" scaled="0"/>
+              <a:tileRect/>
+            </a:gradFill>
+          </a:ln>
+          <a:effectLst>
+            <a:innerShdw blurRad="57150" dist="38100" dir="14460000">
+              <a:srgbClr val="000000">
+                <a:alpha val="70000"/>
+              </a:srgbClr>
+            </a:innerShdw>
+          </a:effectLst>
+        </p:spPr>
+      </p:pic>
+      <p:pic>
+        <p:nvPicPr>
+          <p:cNvPr id="7" name="Content Placeholder 6">
+            <a:extLst>
+              <a:ext uri="{FF2B5EF4-FFF2-40B4-BE49-F238E27FC236}">
+                <a16:creationId xmlns:a16="http://schemas.microsoft.com/office/drawing/2014/main" id="{EDFE5F3F-15E3-BCC0-C327-AC4C1A19C340}"/>
+              </a:ext>
+            </a:extLst>
+          </p:cNvPr>
+          <p:cNvPicPr>
+            <a:picLocks noGrp="1" noChangeAspect="1"/>
+          </p:cNvPicPr>
+          <p:nvPr>
+            <p:ph sz="half" idx="2"/>
+          </p:nvPr>
+        </p:nvPicPr>
+        <p:blipFill>
+          <a:blip r:embed="rId4"/>
+          <a:stretch>
+            <a:fillRect/>
+          </a:stretch>
+        </p:blipFill>
+        <p:spPr>
+          <a:xfrm>
+            <a:off x="8608990" y="4229085"/>
+            <a:ext cx="46" cy="30"/>
+          </a:xfrm>
         </p:spPr>
       </p:pic>
     </p:spTree>
@@ -8417,6 +8623,29 @@
 <file path=ppt/slides/slide3.xml><?xml version="1.0" encoding="utf-8"?>
 <p:sld xmlns:a="http://schemas.openxmlformats.org/drawingml/2006/main" xmlns:r="http://schemas.openxmlformats.org/officeDocument/2006/relationships" xmlns:p="http://schemas.openxmlformats.org/presentationml/2006/main">
   <p:cSld>
+    <p:bg>
+      <p:bgPr>
+        <a:blipFill rotWithShape="1">
+          <a:blip r:embed="rId2">
+            <a:duotone>
+              <a:schemeClr val="bg2">
+                <a:shade val="28000"/>
+                <a:satMod val="94000"/>
+                <a:lumMod val="20000"/>
+              </a:schemeClr>
+              <a:schemeClr val="bg2">
+                <a:tint val="94000"/>
+                <a:shade val="84000"/>
+                <a:satMod val="148000"/>
+                <a:lumMod val="114000"/>
+              </a:schemeClr>
+            </a:duotone>
+          </a:blip>
+          <a:stretch/>
+        </a:blipFill>
+        <a:effectLst/>
+      </p:bgPr>
+    </p:bg>
     <p:spTree>
       <p:nvGrpSpPr>
         <p:cNvPr id="1" name=""/>
@@ -8447,16 +8676,22 @@
             <p:ph type="title"/>
           </p:nvPr>
         </p:nvSpPr>
-        <p:spPr/>
-        <p:txBody>
-          <a:bodyPr/>
+        <p:spPr>
+          <a:xfrm>
+            <a:off x="643192" y="609600"/>
+            <a:ext cx="3643674" cy="1905000"/>
+          </a:xfrm>
+        </p:spPr>
+        <p:txBody>
+          <a:bodyPr vert="horz" lIns="91440" tIns="45720" rIns="91440" bIns="45720" rtlCol="0" anchor="ctr">
+            <a:normAutofit/>
+          </a:bodyPr>
           <a:lstStyle/>
           <a:p>
             <a:r>
-              <a:rPr lang="en-US" dirty="0"/>
+              <a:rPr lang="en-US" sz="2800"/>
               <a:t>List, Python Workhorse</a:t>
             </a:r>
-            <a:endParaRPr lang="en-MY" dirty="0"/>
           </a:p>
         </p:txBody>
       </p:sp>
@@ -8478,12 +8713,14 @@
         </p:nvSpPr>
         <p:spPr>
           <a:xfrm>
-            <a:off x="838200" y="1825625"/>
-            <a:ext cx="4686300" cy="4351338"/>
+            <a:off x="643192" y="2666999"/>
+            <a:ext cx="3643674" cy="3216276"/>
           </a:xfrm>
         </p:spPr>
         <p:txBody>
-          <a:bodyPr/>
+          <a:bodyPr vert="horz" lIns="91440" tIns="45720" rIns="91440" bIns="45720" rtlCol="0" anchor="t">
+            <a:normAutofit/>
+          </a:bodyPr>
           <a:lstStyle/>
           <a:p>
             <a:r>
@@ -8493,7 +8730,7 @@
           </a:p>
           <a:p>
             <a:r>
-              <a:rPr lang="en-US" dirty="0" err="1"/>
+              <a:rPr lang="en-US"/>
               <a:t>Dapat</a:t>
             </a:r>
             <a:r>
@@ -8501,7 +8738,7 @@
               <a:t> </a:t>
             </a:r>
             <a:r>
-              <a:rPr lang="en-US" dirty="0" err="1"/>
+              <a:rPr lang="en-US"/>
               <a:t>memuat</a:t>
             </a:r>
             <a:r>
@@ -8509,7 +8746,7 @@
               <a:t> </a:t>
             </a:r>
             <a:r>
-              <a:rPr lang="en-US" dirty="0" err="1"/>
+              <a:rPr lang="en-US"/>
               <a:t>tipe</a:t>
             </a:r>
             <a:r>
@@ -8517,7 +8754,7 @@
               <a:t> data lain: string, </a:t>
             </a:r>
             <a:r>
-              <a:rPr lang="en-US" dirty="0" err="1"/>
+              <a:rPr lang="en-US"/>
               <a:t>bilangan</a:t>
             </a:r>
             <a:r>
@@ -8525,7 +8762,7 @@
               <a:t>, </a:t>
             </a:r>
             <a:r>
-              <a:rPr lang="en-US" dirty="0" err="1"/>
+              <a:rPr lang="en-US"/>
               <a:t>bahkan</a:t>
             </a:r>
             <a:r>
@@ -8537,10 +8774,10 @@
       </p:sp>
       <p:pic>
         <p:nvPicPr>
-          <p:cNvPr id="8" name="Content Placeholder 7">
+          <p:cNvPr id="7" name="Content Placeholder 6">
             <a:extLst>
               <a:ext uri="{FF2B5EF4-FFF2-40B4-BE49-F238E27FC236}">
-                <a16:creationId xmlns:a16="http://schemas.microsoft.com/office/drawing/2014/main" id="{727C981D-0055-FBD7-5D8D-E83016A70F90}"/>
+                <a16:creationId xmlns:a16="http://schemas.microsoft.com/office/drawing/2014/main" id="{EE6D5048-97A4-D9F0-2FBF-06EF4C9320E8}"/>
               </a:ext>
             </a:extLst>
           </p:cNvPr>
@@ -8552,16 +8789,44 @@
           </p:nvPr>
         </p:nvPicPr>
         <p:blipFill>
-          <a:blip r:embed="rId2"/>
+          <a:blip r:embed="rId3"/>
           <a:stretch>
             <a:fillRect/>
           </a:stretch>
         </p:blipFill>
         <p:spPr>
           <a:xfrm>
-            <a:off x="5915025" y="2339775"/>
-            <a:ext cx="5990328" cy="2622749"/>
+            <a:off x="4630994" y="969199"/>
+            <a:ext cx="6916633" cy="4599561"/>
           </a:xfrm>
+          <a:prstGeom prst="roundRect">
+            <a:avLst>
+              <a:gd name="adj" fmla="val 3517"/>
+            </a:avLst>
+          </a:prstGeom>
+          <a:ln w="38100">
+            <a:gradFill flip="none" rotWithShape="1">
+              <a:gsLst>
+                <a:gs pos="0">
+                  <a:srgbClr val="363D46"/>
+                </a:gs>
+                <a:gs pos="100000">
+                  <a:srgbClr val="363D46">
+                    <a:lumMod val="75000"/>
+                  </a:srgbClr>
+                </a:gs>
+              </a:gsLst>
+              <a:lin ang="5400000" scaled="0"/>
+              <a:tileRect/>
+            </a:gradFill>
+          </a:ln>
+          <a:effectLst>
+            <a:innerShdw blurRad="57150" dist="38100" dir="14460000">
+              <a:srgbClr val="000000">
+                <a:alpha val="70000"/>
+              </a:srgbClr>
+            </a:innerShdw>
+          </a:effectLst>
         </p:spPr>
       </p:pic>
     </p:spTree>
@@ -8580,6 +8845,29 @@
 <file path=ppt/slides/slide4.xml><?xml version="1.0" encoding="utf-8"?>
 <p:sld xmlns:a="http://schemas.openxmlformats.org/drawingml/2006/main" xmlns:r="http://schemas.openxmlformats.org/officeDocument/2006/relationships" xmlns:p="http://schemas.openxmlformats.org/presentationml/2006/main">
   <p:cSld>
+    <p:bg>
+      <p:bgPr>
+        <a:blipFill rotWithShape="1">
+          <a:blip r:embed="rId2">
+            <a:duotone>
+              <a:schemeClr val="bg2">
+                <a:shade val="28000"/>
+                <a:satMod val="94000"/>
+                <a:lumMod val="20000"/>
+              </a:schemeClr>
+              <a:schemeClr val="bg2">
+                <a:tint val="94000"/>
+                <a:shade val="84000"/>
+                <a:satMod val="148000"/>
+                <a:lumMod val="114000"/>
+              </a:schemeClr>
+            </a:duotone>
+          </a:blip>
+          <a:stretch/>
+        </a:blipFill>
+        <a:effectLst/>
+      </p:bgPr>
+    </p:bg>
     <p:spTree>
       <p:nvGrpSpPr>
         <p:cNvPr id="1" name=""/>
@@ -8610,16 +8898,22 @@
             <p:ph type="title"/>
           </p:nvPr>
         </p:nvSpPr>
-        <p:spPr/>
-        <p:txBody>
-          <a:bodyPr/>
+        <p:spPr>
+          <a:xfrm>
+            <a:off x="643192" y="609600"/>
+            <a:ext cx="3643674" cy="1905000"/>
+          </a:xfrm>
+        </p:spPr>
+        <p:txBody>
+          <a:bodyPr vert="horz" lIns="91440" tIns="45720" rIns="91440" bIns="45720" rtlCol="0" anchor="ctr">
+            <a:normAutofit/>
+          </a:bodyPr>
           <a:lstStyle/>
           <a:p>
             <a:r>
-              <a:rPr lang="en-US" dirty="0"/>
+              <a:rPr lang="en-US" sz="2800"/>
               <a:t>Index</a:t>
             </a:r>
-            <a:endParaRPr lang="en-MY" dirty="0"/>
           </a:p>
         </p:txBody>
       </p:sp>
@@ -8641,16 +8935,18 @@
         </p:nvSpPr>
         <p:spPr>
           <a:xfrm>
-            <a:off x="838200" y="1825625"/>
-            <a:ext cx="4238625" cy="4351338"/>
+            <a:off x="643192" y="2666999"/>
+            <a:ext cx="3643674" cy="3216276"/>
           </a:xfrm>
         </p:spPr>
         <p:txBody>
-          <a:bodyPr/>
+          <a:bodyPr vert="horz" lIns="91440" tIns="45720" rIns="91440" bIns="45720" rtlCol="0" anchor="t">
+            <a:normAutofit/>
+          </a:bodyPr>
           <a:lstStyle/>
           <a:p>
             <a:r>
-              <a:rPr lang="en-US" dirty="0" err="1"/>
+              <a:rPr lang="en-US"/>
               <a:t>Mengakses</a:t>
             </a:r>
             <a:r>
@@ -8658,7 +8954,7 @@
               <a:t> </a:t>
             </a:r>
             <a:r>
-              <a:rPr lang="en-US" dirty="0" err="1"/>
+              <a:rPr lang="en-US"/>
               <a:t>anggota</a:t>
             </a:r>
             <a:r>
@@ -8666,7 +8962,7 @@
               <a:t> </a:t>
             </a:r>
             <a:r>
-              <a:rPr lang="en-US" dirty="0" err="1"/>
+              <a:rPr lang="en-US"/>
               <a:t>dari</a:t>
             </a:r>
             <a:r>
@@ -8679,16 +8975,16 @@
               <a:rPr lang="en-US" dirty="0"/>
               <a:t>Awal: 0</a:t>
             </a:r>
-            <a:endParaRPr lang="en-MY" dirty="0"/>
+            <a:endParaRPr lang="en-US"/>
           </a:p>
         </p:txBody>
       </p:sp>
       <p:pic>
         <p:nvPicPr>
-          <p:cNvPr id="8" name="Content Placeholder 7">
+          <p:cNvPr id="7" name="Content Placeholder 6">
             <a:extLst>
               <a:ext uri="{FF2B5EF4-FFF2-40B4-BE49-F238E27FC236}">
-                <a16:creationId xmlns:a16="http://schemas.microsoft.com/office/drawing/2014/main" id="{5B04D229-6600-AAA4-40FE-D71898B7A661}"/>
+                <a16:creationId xmlns:a16="http://schemas.microsoft.com/office/drawing/2014/main" id="{492B6EA3-431A-7D42-26B1-36A90CEEA8A8}"/>
               </a:ext>
             </a:extLst>
           </p:cNvPr>
@@ -8700,16 +8996,44 @@
           </p:nvPr>
         </p:nvPicPr>
         <p:blipFill>
-          <a:blip r:embed="rId2"/>
+          <a:blip r:embed="rId3"/>
           <a:stretch>
             <a:fillRect/>
           </a:stretch>
         </p:blipFill>
         <p:spPr>
           <a:xfrm>
-            <a:off x="5362803" y="1825625"/>
-            <a:ext cx="6375617" cy="3167063"/>
+            <a:off x="4630994" y="1470655"/>
+            <a:ext cx="6916633" cy="3596649"/>
           </a:xfrm>
+          <a:prstGeom prst="roundRect">
+            <a:avLst>
+              <a:gd name="adj" fmla="val 3517"/>
+            </a:avLst>
+          </a:prstGeom>
+          <a:ln w="38100">
+            <a:gradFill flip="none" rotWithShape="1">
+              <a:gsLst>
+                <a:gs pos="0">
+                  <a:srgbClr val="363D46"/>
+                </a:gs>
+                <a:gs pos="100000">
+                  <a:srgbClr val="363D46">
+                    <a:lumMod val="75000"/>
+                  </a:srgbClr>
+                </a:gs>
+              </a:gsLst>
+              <a:lin ang="5400000" scaled="0"/>
+              <a:tileRect/>
+            </a:gradFill>
+          </a:ln>
+          <a:effectLst>
+            <a:innerShdw blurRad="57150" dist="38100" dir="14460000">
+              <a:srgbClr val="000000">
+                <a:alpha val="70000"/>
+              </a:srgbClr>
+            </a:innerShdw>
+          </a:effectLst>
         </p:spPr>
       </p:pic>
     </p:spTree>
@@ -8924,43 +9248,27 @@
           <a:p>
             <a:r>
               <a:rPr lang="en-US"/>
-              <a:t>Dapat</a:t>
-            </a:r>
-            <a:r>
-              <a:rPr lang="en-US" dirty="0"/>
-              <a:t> </a:t>
+              <a:t>Dapat memuat tipe </a:t>
+            </a:r>
+            <a:r>
+              <a:rPr lang="en-US" dirty="0"/>
+              <a:t>data lain: string</a:t>
             </a:r>
             <a:r>
               <a:rPr lang="en-US"/>
-              <a:t>memuat</a:t>
-            </a:r>
-            <a:r>
-              <a:rPr lang="en-US" dirty="0"/>
-              <a:t> </a:t>
+              <a:t>, bilangan,  </a:t>
+            </a:r>
+            <a:r>
+              <a:rPr lang="en-US" dirty="0"/>
+              <a:t>list</a:t>
             </a:r>
             <a:r>
               <a:rPr lang="en-US"/>
-              <a:t>tipe</a:t>
-            </a:r>
-            <a:r>
-              <a:rPr lang="en-US" dirty="0"/>
-              <a:t> data lain: string, </a:t>
-            </a:r>
-            <a:r>
-              <a:rPr lang="en-US"/>
-              <a:t>bilangan</a:t>
-            </a:r>
-            <a:r>
-              <a:rPr lang="en-US" dirty="0"/>
-              <a:t>, </a:t>
-            </a:r>
-            <a:r>
-              <a:rPr lang="en-US"/>
-              <a:t>bahkan</a:t>
-            </a:r>
-            <a:r>
-              <a:rPr lang="en-US" dirty="0"/>
-              <a:t> tuple lain</a:t>
+              <a:t>, bahkan </a:t>
+            </a:r>
+            <a:r>
+              <a:rPr lang="en-US" dirty="0"/>
+              <a:t>tuple lain</a:t>
             </a:r>
           </a:p>
           <a:p>
@@ -8973,10 +9281,10 @@
       </p:sp>
       <p:pic>
         <p:nvPicPr>
-          <p:cNvPr id="10" name="Picture 9">
+          <p:cNvPr id="3" name="Picture 2">
             <a:extLst>
               <a:ext uri="{FF2B5EF4-FFF2-40B4-BE49-F238E27FC236}">
-                <a16:creationId xmlns:a16="http://schemas.microsoft.com/office/drawing/2014/main" id="{A5F9C671-A575-8BFA-963D-F5D54FB8309B}"/>
+                <a16:creationId xmlns:a16="http://schemas.microsoft.com/office/drawing/2014/main" id="{BD6EFAC0-E8F9-FD9E-13BC-922E84468BE2}"/>
               </a:ext>
             </a:extLst>
           </p:cNvPr>
@@ -8993,8 +9301,8 @@
         </p:blipFill>
         <p:spPr>
           <a:xfrm>
-            <a:off x="4630994" y="1050527"/>
-            <a:ext cx="6916633" cy="4436904"/>
+            <a:off x="4630994" y="1634925"/>
+            <a:ext cx="6916633" cy="3268108"/>
           </a:xfrm>
           <a:prstGeom prst="roundRect">
             <a:avLst>
@@ -9266,7 +9574,7 @@
           </a:p>
           <a:p>
             <a:r>
-              <a:rPr lang="en-US" dirty="0" err="1"/>
+              <a:rPr lang="en-US"/>
               <a:t>Dapat</a:t>
             </a:r>
             <a:r>
@@ -9274,7 +9582,7 @@
               <a:t> </a:t>
             </a:r>
             <a:r>
-              <a:rPr lang="en-US" dirty="0" err="1"/>
+              <a:rPr lang="en-US"/>
               <a:t>memuat</a:t>
             </a:r>
             <a:r>
@@ -9282,7 +9590,7 @@
               <a:t> </a:t>
             </a:r>
             <a:r>
-              <a:rPr lang="en-US" dirty="0" err="1"/>
+              <a:rPr lang="en-US"/>
               <a:t>tipe</a:t>
             </a:r>
             <a:r>
@@ -9290,10 +9598,53 @@
               <a:t> data lain: string, </a:t>
             </a:r>
             <a:r>
-              <a:rPr lang="en-US" dirty="0" err="1"/>
+              <a:rPr lang="en-US"/>
               <a:t>bilangan</a:t>
             </a:r>
-            <a:endParaRPr lang="en-US" dirty="0"/>
+            <a:r>
+              <a:rPr lang="en-US" dirty="0"/>
+              <a:t> </a:t>
+            </a:r>
+            <a:r>
+              <a:rPr lang="en-US"/>
+              <a:t>tapi</a:t>
+            </a:r>
+            <a:r>
+              <a:rPr lang="en-US" dirty="0"/>
+              <a:t> </a:t>
+            </a:r>
+            <a:r>
+              <a:rPr lang="en-US"/>
+              <a:t>tidak</a:t>
+            </a:r>
+            <a:r>
+              <a:rPr lang="en-US" dirty="0"/>
+              <a:t> </a:t>
+            </a:r>
+            <a:r>
+              <a:rPr lang="en-US"/>
+              <a:t>bisa</a:t>
+            </a:r>
+            <a:r>
+              <a:rPr lang="en-US" dirty="0"/>
+              <a:t> </a:t>
+            </a:r>
+            <a:r>
+              <a:rPr lang="en-US"/>
+              <a:t>berisikan</a:t>
+            </a:r>
+            <a:r>
+              <a:rPr lang="en-US" dirty="0"/>
+              <a:t> list </a:t>
+            </a:r>
+            <a:r>
+              <a:rPr lang="en-US"/>
+              <a:t>ataupun</a:t>
+            </a:r>
+            <a:r>
+              <a:rPr lang="en-US" dirty="0"/>
+              <a:t> set lain</a:t>
+            </a:r>
           </a:p>
           <a:p>
             <a:r>
@@ -9301,7 +9652,7 @@
               <a:t>Member </a:t>
             </a:r>
             <a:r>
-              <a:rPr lang="en-US" dirty="0" err="1"/>
+              <a:rPr lang="en-US"/>
               <a:t>adalah</a:t>
             </a:r>
             <a:r>
@@ -9309,7 +9660,7 @@
               <a:t> </a:t>
             </a:r>
             <a:r>
-              <a:rPr lang="en-US" dirty="0" err="1"/>
+              <a:rPr lang="en-US"/>
               <a:t>unik</a:t>
             </a:r>
             <a:endParaRPr lang="en-US" dirty="0"/>
@@ -9318,10 +9669,10 @@
       </p:sp>
       <p:pic>
         <p:nvPicPr>
-          <p:cNvPr id="6" name="Picture 5">
+          <p:cNvPr id="9" name="Picture 8">
             <a:extLst>
               <a:ext uri="{FF2B5EF4-FFF2-40B4-BE49-F238E27FC236}">
-                <a16:creationId xmlns:a16="http://schemas.microsoft.com/office/drawing/2014/main" id="{8856CF61-66DE-D642-D72C-EAEDBBF35618}"/>
+                <a16:creationId xmlns:a16="http://schemas.microsoft.com/office/drawing/2014/main" id="{70BC5809-5BF7-0F7E-2CB6-790B642ABCC9}"/>
               </a:ext>
             </a:extLst>
           </p:cNvPr>
@@ -9338,8 +9689,8 @@
         </p:blipFill>
         <p:spPr>
           <a:xfrm>
-            <a:off x="4630994" y="1449915"/>
-            <a:ext cx="6916633" cy="3638129"/>
+            <a:off x="4630994" y="1617633"/>
+            <a:ext cx="6916633" cy="3302692"/>
           </a:xfrm>
           <a:prstGeom prst="roundRect">
             <a:avLst>

</xml_diff>